<commit_message>
add instructions to step 3
</commit_message>
<xml_diff>
--- a/finalproject/img/images.pptx
+++ b/finalproject/img/images.pptx
@@ -9,6 +9,7 @@
     <p:sldId id="257" r:id="rId3"/>
     <p:sldId id="259" r:id="rId4"/>
     <p:sldId id="258" r:id="rId5"/>
+    <p:sldId id="260" r:id="rId6"/>
   </p:sldIdLst>
   <p:sldSz cx="9144000" cy="6858000" type="screen4x3"/>
   <p:notesSz cx="6858000" cy="9144000"/>
@@ -291,7 +292,7 @@
           <a:p>
             <a:fld id="{F408532A-66BC-1945-A1DD-EF7A940BE64F}" type="datetimeFigureOut">
               <a:rPr lang="en-US" smtClean="0"/>
-              <a:t>11/16/14</a:t>
+              <a:t>12/13/14</a:t>
             </a:fld>
             <a:endParaRPr lang="en-US"/>
           </a:p>
@@ -461,7 +462,7 @@
           <a:p>
             <a:fld id="{F408532A-66BC-1945-A1DD-EF7A940BE64F}" type="datetimeFigureOut">
               <a:rPr lang="en-US" smtClean="0"/>
-              <a:t>11/16/14</a:t>
+              <a:t>12/13/14</a:t>
             </a:fld>
             <a:endParaRPr lang="en-US"/>
           </a:p>
@@ -641,7 +642,7 @@
           <a:p>
             <a:fld id="{F408532A-66BC-1945-A1DD-EF7A940BE64F}" type="datetimeFigureOut">
               <a:rPr lang="en-US" smtClean="0"/>
-              <a:t>11/16/14</a:t>
+              <a:t>12/13/14</a:t>
             </a:fld>
             <a:endParaRPr lang="en-US"/>
           </a:p>
@@ -811,7 +812,7 @@
           <a:p>
             <a:fld id="{F408532A-66BC-1945-A1DD-EF7A940BE64F}" type="datetimeFigureOut">
               <a:rPr lang="en-US" smtClean="0"/>
-              <a:t>11/16/14</a:t>
+              <a:t>12/13/14</a:t>
             </a:fld>
             <a:endParaRPr lang="en-US"/>
           </a:p>
@@ -1057,7 +1058,7 @@
           <a:p>
             <a:fld id="{F408532A-66BC-1945-A1DD-EF7A940BE64F}" type="datetimeFigureOut">
               <a:rPr lang="en-US" smtClean="0"/>
-              <a:t>11/16/14</a:t>
+              <a:t>12/13/14</a:t>
             </a:fld>
             <a:endParaRPr lang="en-US"/>
           </a:p>
@@ -1345,7 +1346,7 @@
           <a:p>
             <a:fld id="{F408532A-66BC-1945-A1DD-EF7A940BE64F}" type="datetimeFigureOut">
               <a:rPr lang="en-US" smtClean="0"/>
-              <a:t>11/16/14</a:t>
+              <a:t>12/13/14</a:t>
             </a:fld>
             <a:endParaRPr lang="en-US"/>
           </a:p>
@@ -1767,7 +1768,7 @@
           <a:p>
             <a:fld id="{F408532A-66BC-1945-A1DD-EF7A940BE64F}" type="datetimeFigureOut">
               <a:rPr lang="en-US" smtClean="0"/>
-              <a:t>11/16/14</a:t>
+              <a:t>12/13/14</a:t>
             </a:fld>
             <a:endParaRPr lang="en-US"/>
           </a:p>
@@ -1885,7 +1886,7 @@
           <a:p>
             <a:fld id="{F408532A-66BC-1945-A1DD-EF7A940BE64F}" type="datetimeFigureOut">
               <a:rPr lang="en-US" smtClean="0"/>
-              <a:t>11/16/14</a:t>
+              <a:t>12/13/14</a:t>
             </a:fld>
             <a:endParaRPr lang="en-US"/>
           </a:p>
@@ -1980,7 +1981,7 @@
           <a:p>
             <a:fld id="{F408532A-66BC-1945-A1DD-EF7A940BE64F}" type="datetimeFigureOut">
               <a:rPr lang="en-US" smtClean="0"/>
-              <a:t>11/16/14</a:t>
+              <a:t>12/13/14</a:t>
             </a:fld>
             <a:endParaRPr lang="en-US"/>
           </a:p>
@@ -2257,7 +2258,7 @@
           <a:p>
             <a:fld id="{F408532A-66BC-1945-A1DD-EF7A940BE64F}" type="datetimeFigureOut">
               <a:rPr lang="en-US" smtClean="0"/>
-              <a:t>11/16/14</a:t>
+              <a:t>12/13/14</a:t>
             </a:fld>
             <a:endParaRPr lang="en-US"/>
           </a:p>
@@ -2510,7 +2511,7 @@
           <a:p>
             <a:fld id="{F408532A-66BC-1945-A1DD-EF7A940BE64F}" type="datetimeFigureOut">
               <a:rPr lang="en-US" smtClean="0"/>
-              <a:t>11/16/14</a:t>
+              <a:t>12/13/14</a:t>
             </a:fld>
             <a:endParaRPr lang="en-US"/>
           </a:p>
@@ -2723,7 +2724,7 @@
           <a:p>
             <a:fld id="{F408532A-66BC-1945-A1DD-EF7A940BE64F}" type="datetimeFigureOut">
               <a:rPr lang="en-US" smtClean="0"/>
-              <a:t>11/16/14</a:t>
+              <a:t>12/13/14</a:t>
             </a:fld>
             <a:endParaRPr lang="en-US"/>
           </a:p>
@@ -4366,10 +4367,6 @@
                 </a:rPr>
                 <a:t>4</a:t>
               </a:r>
-              <a:endParaRPr lang="en-US" dirty="0">
-                <a:latin typeface="Helvetica"/>
-                <a:cs typeface="Helvetica"/>
-              </a:endParaRPr>
             </a:p>
           </p:txBody>
         </p:sp>
@@ -4419,7 +4416,6 @@
                 <a:rPr lang="en-US" dirty="0"/>
                 <a:t>7</a:t>
               </a:r>
-              <a:endParaRPr lang="en-US" dirty="0"/>
             </a:p>
           </p:txBody>
         </p:sp>
@@ -4469,7 +4465,6 @@
                 <a:rPr lang="en-US" dirty="0"/>
                 <a:t>8</a:t>
               </a:r>
-              <a:endParaRPr lang="en-US" dirty="0"/>
             </a:p>
           </p:txBody>
         </p:sp>
@@ -4538,10 +4533,6 @@
                 </a:rPr>
                 <a:t>B</a:t>
               </a:r>
-              <a:endParaRPr lang="en-US" dirty="0">
-                <a:latin typeface="Helvetica"/>
-                <a:cs typeface="Helvetica"/>
-              </a:endParaRPr>
             </a:p>
           </p:txBody>
         </p:sp>
@@ -4574,10 +4565,6 @@
                 </a:rPr>
                 <a:t>C</a:t>
               </a:r>
-              <a:endParaRPr lang="en-US" dirty="0">
-                <a:latin typeface="Helvetica"/>
-                <a:cs typeface="Helvetica"/>
-              </a:endParaRPr>
             </a:p>
           </p:txBody>
         </p:sp>
@@ -4610,10 +4597,6 @@
                 </a:rPr>
                 <a:t>D</a:t>
               </a:r>
-              <a:endParaRPr lang="en-US" dirty="0">
-                <a:latin typeface="Helvetica"/>
-                <a:cs typeface="Helvetica"/>
-              </a:endParaRPr>
             </a:p>
           </p:txBody>
         </p:sp>
@@ -5605,10 +5588,6 @@
                 </a:rPr>
                 <a:t>4</a:t>
               </a:r>
-              <a:endParaRPr lang="en-US" dirty="0">
-                <a:latin typeface="Helvetica"/>
-                <a:cs typeface="Helvetica"/>
-              </a:endParaRPr>
             </a:p>
           </p:txBody>
         </p:sp>
@@ -5658,7 +5637,6 @@
                 <a:rPr lang="en-US" dirty="0"/>
                 <a:t>7</a:t>
               </a:r>
-              <a:endParaRPr lang="en-US" dirty="0"/>
             </a:p>
           </p:txBody>
         </p:sp>
@@ -5691,10 +5669,6 @@
                 </a:rPr>
                 <a:t>B</a:t>
               </a:r>
-              <a:endParaRPr lang="en-US" dirty="0">
-                <a:latin typeface="Helvetica"/>
-                <a:cs typeface="Helvetica"/>
-              </a:endParaRPr>
             </a:p>
           </p:txBody>
         </p:sp>
@@ -5727,10 +5701,6 @@
                 </a:rPr>
                 <a:t>C</a:t>
               </a:r>
-              <a:endParaRPr lang="en-US" dirty="0">
-                <a:latin typeface="Helvetica"/>
-                <a:cs typeface="Helvetica"/>
-              </a:endParaRPr>
             </a:p>
           </p:txBody>
         </p:sp>
@@ -5763,10 +5733,6 @@
                 </a:rPr>
                 <a:t>D</a:t>
               </a:r>
-              <a:endParaRPr lang="en-US" dirty="0">
-                <a:latin typeface="Helvetica"/>
-                <a:cs typeface="Helvetica"/>
-              </a:endParaRPr>
             </a:p>
           </p:txBody>
         </p:sp>
@@ -5872,7 +5838,6 @@
                 <a:rPr lang="en-US" dirty="0"/>
                 <a:t>8</a:t>
               </a:r>
-              <a:endParaRPr lang="en-US" dirty="0"/>
             </a:p>
           </p:txBody>
         </p:sp>
@@ -6820,7 +6785,6 @@
                 <a:rPr lang="en-US" dirty="0"/>
                 <a:t>7</a:t>
               </a:r>
-              <a:endParaRPr lang="en-US" dirty="0"/>
             </a:p>
           </p:txBody>
         </p:sp>
@@ -6870,7 +6834,6 @@
                 <a:rPr lang="en-US" dirty="0"/>
                 <a:t>8</a:t>
               </a:r>
-              <a:endParaRPr lang="en-US" dirty="0"/>
             </a:p>
           </p:txBody>
         </p:sp>
@@ -6939,10 +6902,6 @@
                 </a:rPr>
                 <a:t>C</a:t>
               </a:r>
-              <a:endParaRPr lang="en-US" dirty="0">
-                <a:latin typeface="Helvetica"/>
-                <a:cs typeface="Helvetica"/>
-              </a:endParaRPr>
             </a:p>
           </p:txBody>
         </p:sp>
@@ -6975,10 +6934,6 @@
                 </a:rPr>
                 <a:t>D</a:t>
               </a:r>
-              <a:endParaRPr lang="en-US" dirty="0">
-                <a:latin typeface="Helvetica"/>
-                <a:cs typeface="Helvetica"/>
-              </a:endParaRPr>
             </a:p>
           </p:txBody>
         </p:sp>
@@ -8255,10 +8210,6 @@
                 </a:rPr>
                 <a:t>4</a:t>
               </a:r>
-              <a:endParaRPr lang="en-US" dirty="0">
-                <a:latin typeface="Helvetica"/>
-                <a:cs typeface="Helvetica"/>
-              </a:endParaRPr>
             </a:p>
           </p:txBody>
         </p:sp>
@@ -8327,10 +8278,6 @@
                 </a:rPr>
                 <a:t>B</a:t>
               </a:r>
-              <a:endParaRPr lang="en-US" dirty="0">
-                <a:latin typeface="Helvetica"/>
-                <a:cs typeface="Helvetica"/>
-              </a:endParaRPr>
             </a:p>
           </p:txBody>
         </p:sp>
@@ -8363,10 +8310,6 @@
                 </a:rPr>
                 <a:t>C</a:t>
               </a:r>
-              <a:endParaRPr lang="en-US" dirty="0">
-                <a:latin typeface="Helvetica"/>
-                <a:cs typeface="Helvetica"/>
-              </a:endParaRPr>
             </a:p>
           </p:txBody>
         </p:sp>
@@ -20103,6 +20046,1702 @@
     <p:extLst>
       <p:ext uri="{BB962C8B-B14F-4D97-AF65-F5344CB8AC3E}">
         <p14:creationId xmlns:p14="http://schemas.microsoft.com/office/powerpoint/2010/main" val="3322021405"/>
+      </p:ext>
+    </p:extLst>
+  </p:cSld>
+  <p:clrMapOvr>
+    <a:masterClrMapping/>
+  </p:clrMapOvr>
+</p:sld>
+</file>
+
+<file path=ppt/slides/slide5.xml><?xml version="1.0" encoding="utf-8"?>
+<p:sld xmlns:a="http://schemas.openxmlformats.org/drawingml/2006/main" xmlns:r="http://schemas.openxmlformats.org/officeDocument/2006/relationships" xmlns:p="http://schemas.openxmlformats.org/presentationml/2006/main">
+  <p:cSld>
+    <p:spTree>
+      <p:nvGrpSpPr>
+        <p:cNvPr id="1" name=""/>
+        <p:cNvGrpSpPr/>
+        <p:nvPr/>
+      </p:nvGrpSpPr>
+      <p:grpSpPr>
+        <a:xfrm>
+          <a:off x="0" y="0"/>
+          <a:ext cx="0" cy="0"/>
+          <a:chOff x="0" y="0"/>
+          <a:chExt cx="0" cy="0"/>
+        </a:xfrm>
+      </p:grpSpPr>
+      <p:sp>
+        <p:nvSpPr>
+          <p:cNvPr id="4" name="Rectangle 3"/>
+          <p:cNvSpPr/>
+          <p:nvPr/>
+        </p:nvSpPr>
+        <p:spPr>
+          <a:xfrm>
+            <a:off x="172536" y="11114"/>
+            <a:ext cx="4537403" cy="3293127"/>
+          </a:xfrm>
+          <a:prstGeom prst="rect">
+            <a:avLst/>
+          </a:prstGeom>
+          <a:solidFill>
+            <a:schemeClr val="bg1">
+              <a:lumMod val="65000"/>
+            </a:schemeClr>
+          </a:solidFill>
+          <a:ln>
+            <a:solidFill>
+              <a:schemeClr val="bg1">
+                <a:lumMod val="65000"/>
+              </a:schemeClr>
+            </a:solidFill>
+          </a:ln>
+        </p:spPr>
+        <p:style>
+          <a:lnRef idx="2">
+            <a:schemeClr val="dk1">
+              <a:shade val="50000"/>
+            </a:schemeClr>
+          </a:lnRef>
+          <a:fillRef idx="1">
+            <a:schemeClr val="dk1"/>
+          </a:fillRef>
+          <a:effectRef idx="0">
+            <a:schemeClr val="dk1"/>
+          </a:effectRef>
+          <a:fontRef idx="minor">
+            <a:schemeClr val="lt1"/>
+          </a:fontRef>
+        </p:style>
+        <p:txBody>
+          <a:bodyPr rtlCol="0" anchor="ctr"/>
+          <a:lstStyle/>
+          <a:p>
+            <a:pPr algn="ctr"/>
+            <a:endParaRPr lang="en-US" dirty="0"/>
+          </a:p>
+        </p:txBody>
+      </p:sp>
+      <p:sp>
+        <p:nvSpPr>
+          <p:cNvPr id="5" name="Rectangle 4"/>
+          <p:cNvSpPr/>
+          <p:nvPr/>
+        </p:nvSpPr>
+        <p:spPr>
+          <a:xfrm>
+            <a:off x="2289654" y="543939"/>
+            <a:ext cx="813940" cy="2760302"/>
+          </a:xfrm>
+          <a:prstGeom prst="rect">
+            <a:avLst/>
+          </a:prstGeom>
+          <a:solidFill>
+            <a:schemeClr val="bg1"/>
+          </a:solidFill>
+          <a:ln>
+            <a:noFill/>
+          </a:ln>
+        </p:spPr>
+        <p:style>
+          <a:lnRef idx="2">
+            <a:schemeClr val="dk1">
+              <a:shade val="50000"/>
+            </a:schemeClr>
+          </a:lnRef>
+          <a:fillRef idx="1">
+            <a:schemeClr val="dk1"/>
+          </a:fillRef>
+          <a:effectRef idx="0">
+            <a:schemeClr val="dk1"/>
+          </a:effectRef>
+          <a:fontRef idx="minor">
+            <a:schemeClr val="lt1"/>
+          </a:fontRef>
+        </p:style>
+        <p:txBody>
+          <a:bodyPr rtlCol="0" anchor="ctr"/>
+          <a:lstStyle/>
+          <a:p>
+            <a:pPr algn="ctr"/>
+            <a:endParaRPr lang="en-US"/>
+          </a:p>
+        </p:txBody>
+      </p:sp>
+      <p:sp>
+        <p:nvSpPr>
+          <p:cNvPr id="6" name="Rectangle 5"/>
+          <p:cNvSpPr/>
+          <p:nvPr/>
+        </p:nvSpPr>
+        <p:spPr>
+          <a:xfrm rot="16200000">
+            <a:off x="2034268" y="-1317792"/>
+            <a:ext cx="813940" cy="4537402"/>
+          </a:xfrm>
+          <a:prstGeom prst="rect">
+            <a:avLst/>
+          </a:prstGeom>
+          <a:solidFill>
+            <a:schemeClr val="bg1"/>
+          </a:solidFill>
+          <a:ln>
+            <a:noFill/>
+          </a:ln>
+        </p:spPr>
+        <p:style>
+          <a:lnRef idx="2">
+            <a:schemeClr val="dk1">
+              <a:shade val="50000"/>
+            </a:schemeClr>
+          </a:lnRef>
+          <a:fillRef idx="1">
+            <a:schemeClr val="dk1"/>
+          </a:fillRef>
+          <a:effectRef idx="0">
+            <a:schemeClr val="dk1"/>
+          </a:effectRef>
+          <a:fontRef idx="minor">
+            <a:schemeClr val="lt1"/>
+          </a:fontRef>
+        </p:style>
+        <p:txBody>
+          <a:bodyPr rtlCol="0" anchor="ctr"/>
+          <a:lstStyle/>
+          <a:p>
+            <a:pPr algn="ctr"/>
+            <a:endParaRPr lang="en-US"/>
+          </a:p>
+        </p:txBody>
+      </p:sp>
+      <p:pic>
+        <p:nvPicPr>
+          <p:cNvPr id="28" name="Picture 27" descr="pawn_white.png"/>
+          <p:cNvPicPr>
+            <a:picLocks noChangeAspect="1"/>
+          </p:cNvPicPr>
+          <p:nvPr/>
+        </p:nvPicPr>
+        <p:blipFill>
+          <a:blip r:embed="rId2">
+            <a:extLst>
+              <a:ext uri="{28A0092B-C50C-407E-A947-70E740481C1C}">
+                <a14:useLocalDpi xmlns:a14="http://schemas.microsoft.com/office/drawing/2010/main" val="0"/>
+              </a:ext>
+            </a:extLst>
+          </a:blip>
+          <a:stretch>
+            <a:fillRect/>
+          </a:stretch>
+        </p:blipFill>
+        <p:spPr>
+          <a:xfrm>
+            <a:off x="1285819" y="2331880"/>
+            <a:ext cx="646189" cy="833561"/>
+          </a:xfrm>
+          <a:prstGeom prst="rect">
+            <a:avLst/>
+          </a:prstGeom>
+          <a:ln>
+            <a:noFill/>
+          </a:ln>
+        </p:spPr>
+      </p:pic>
+      <p:sp>
+        <p:nvSpPr>
+          <p:cNvPr id="29" name="Rectangle 28"/>
+          <p:cNvSpPr/>
+          <p:nvPr/>
+        </p:nvSpPr>
+        <p:spPr>
+          <a:xfrm>
+            <a:off x="2612809" y="979656"/>
+            <a:ext cx="170755" cy="2324585"/>
+          </a:xfrm>
+          <a:prstGeom prst="rect">
+            <a:avLst/>
+          </a:prstGeom>
+          <a:solidFill>
+            <a:srgbClr val="0000FF"/>
+          </a:solidFill>
+          <a:ln>
+            <a:noFill/>
+          </a:ln>
+        </p:spPr>
+        <p:style>
+          <a:lnRef idx="2">
+            <a:schemeClr val="dk1">
+              <a:shade val="50000"/>
+            </a:schemeClr>
+          </a:lnRef>
+          <a:fillRef idx="1">
+            <a:schemeClr val="dk1"/>
+          </a:fillRef>
+          <a:effectRef idx="0">
+            <a:schemeClr val="dk1"/>
+          </a:effectRef>
+          <a:fontRef idx="minor">
+            <a:schemeClr val="lt1"/>
+          </a:fontRef>
+        </p:style>
+        <p:txBody>
+          <a:bodyPr rtlCol="0" anchor="ctr"/>
+          <a:lstStyle/>
+          <a:p>
+            <a:pPr algn="ctr"/>
+            <a:endParaRPr lang="en-US"/>
+          </a:p>
+        </p:txBody>
+      </p:sp>
+      <p:sp>
+        <p:nvSpPr>
+          <p:cNvPr id="30" name="Rectangle 29"/>
+          <p:cNvSpPr/>
+          <p:nvPr/>
+        </p:nvSpPr>
+        <p:spPr>
+          <a:xfrm rot="16200000">
+            <a:off x="1392675" y="-378101"/>
+            <a:ext cx="170756" cy="2611027"/>
+          </a:xfrm>
+          <a:prstGeom prst="rect">
+            <a:avLst/>
+          </a:prstGeom>
+          <a:solidFill>
+            <a:srgbClr val="0000FF"/>
+          </a:solidFill>
+          <a:ln>
+            <a:noFill/>
+          </a:ln>
+        </p:spPr>
+        <p:style>
+          <a:lnRef idx="2">
+            <a:schemeClr val="dk1">
+              <a:shade val="50000"/>
+            </a:schemeClr>
+          </a:lnRef>
+          <a:fillRef idx="1">
+            <a:schemeClr val="dk1"/>
+          </a:fillRef>
+          <a:effectRef idx="0">
+            <a:schemeClr val="dk1"/>
+          </a:effectRef>
+          <a:fontRef idx="minor">
+            <a:schemeClr val="lt1"/>
+          </a:fontRef>
+        </p:style>
+        <p:txBody>
+          <a:bodyPr rtlCol="0" anchor="ctr"/>
+          <a:lstStyle/>
+          <a:p>
+            <a:pPr algn="ctr"/>
+            <a:endParaRPr lang="en-US"/>
+          </a:p>
+        </p:txBody>
+      </p:sp>
+      <p:sp>
+        <p:nvSpPr>
+          <p:cNvPr id="31" name="Isosceles Triangle 30"/>
+          <p:cNvSpPr/>
+          <p:nvPr/>
+        </p:nvSpPr>
+        <p:spPr>
+          <a:xfrm rot="16200000">
+            <a:off x="909323" y="752143"/>
+            <a:ext cx="414516" cy="338476"/>
+          </a:xfrm>
+          <a:prstGeom prst="triangle">
+            <a:avLst/>
+          </a:prstGeom>
+          <a:solidFill>
+            <a:srgbClr val="0000FF"/>
+          </a:solidFill>
+          <a:ln>
+            <a:noFill/>
+          </a:ln>
+        </p:spPr>
+        <p:style>
+          <a:lnRef idx="2">
+            <a:schemeClr val="accent1"/>
+          </a:lnRef>
+          <a:fillRef idx="1">
+            <a:schemeClr val="lt1"/>
+          </a:fillRef>
+          <a:effectRef idx="0">
+            <a:schemeClr val="accent1"/>
+          </a:effectRef>
+          <a:fontRef idx="minor">
+            <a:schemeClr val="dk1"/>
+          </a:fontRef>
+        </p:style>
+        <p:txBody>
+          <a:bodyPr rtlCol="0" anchor="ctr"/>
+          <a:lstStyle/>
+          <a:p>
+            <a:pPr algn="ctr"/>
+            <a:endParaRPr lang="en-US"/>
+          </a:p>
+        </p:txBody>
+      </p:sp>
+      <p:sp>
+        <p:nvSpPr>
+          <p:cNvPr id="32" name="Isosceles Triangle 31"/>
+          <p:cNvSpPr/>
+          <p:nvPr/>
+        </p:nvSpPr>
+        <p:spPr>
+          <a:xfrm>
+            <a:off x="2486622" y="1705508"/>
+            <a:ext cx="414516" cy="338476"/>
+          </a:xfrm>
+          <a:prstGeom prst="triangle">
+            <a:avLst/>
+          </a:prstGeom>
+          <a:solidFill>
+            <a:srgbClr val="0000FF"/>
+          </a:solidFill>
+          <a:ln>
+            <a:noFill/>
+          </a:ln>
+        </p:spPr>
+        <p:style>
+          <a:lnRef idx="2">
+            <a:schemeClr val="accent1"/>
+          </a:lnRef>
+          <a:fillRef idx="1">
+            <a:schemeClr val="lt1"/>
+          </a:fillRef>
+          <a:effectRef idx="0">
+            <a:schemeClr val="accent1"/>
+          </a:effectRef>
+          <a:fontRef idx="minor">
+            <a:schemeClr val="dk1"/>
+          </a:fontRef>
+        </p:style>
+        <p:txBody>
+          <a:bodyPr rtlCol="0" anchor="ctr"/>
+          <a:lstStyle/>
+          <a:p>
+            <a:pPr algn="ctr"/>
+            <a:endParaRPr lang="en-US"/>
+          </a:p>
+        </p:txBody>
+      </p:sp>
+      <p:sp>
+        <p:nvSpPr>
+          <p:cNvPr id="33" name="Rectangle 32"/>
+          <p:cNvSpPr/>
+          <p:nvPr/>
+        </p:nvSpPr>
+        <p:spPr>
+          <a:xfrm>
+            <a:off x="3103594" y="1357880"/>
+            <a:ext cx="170755" cy="1946362"/>
+          </a:xfrm>
+          <a:prstGeom prst="rect">
+            <a:avLst/>
+          </a:prstGeom>
+          <a:solidFill>
+            <a:schemeClr val="tx1"/>
+          </a:solidFill>
+          <a:ln>
+            <a:noFill/>
+          </a:ln>
+        </p:spPr>
+        <p:style>
+          <a:lnRef idx="2">
+            <a:schemeClr val="dk1">
+              <a:shade val="50000"/>
+            </a:schemeClr>
+          </a:lnRef>
+          <a:fillRef idx="1">
+            <a:schemeClr val="dk1"/>
+          </a:fillRef>
+          <a:effectRef idx="0">
+            <a:schemeClr val="dk1"/>
+          </a:effectRef>
+          <a:fontRef idx="minor">
+            <a:schemeClr val="lt1"/>
+          </a:fontRef>
+        </p:style>
+        <p:txBody>
+          <a:bodyPr rtlCol="0" anchor="ctr"/>
+          <a:lstStyle/>
+          <a:p>
+            <a:pPr algn="ctr"/>
+            <a:endParaRPr lang="en-US"/>
+          </a:p>
+        </p:txBody>
+      </p:sp>
+      <p:sp>
+        <p:nvSpPr>
+          <p:cNvPr id="34" name="Rectangle 33"/>
+          <p:cNvSpPr/>
+          <p:nvPr/>
+        </p:nvSpPr>
+        <p:spPr>
+          <a:xfrm>
+            <a:off x="2118899" y="1357880"/>
+            <a:ext cx="170755" cy="1946362"/>
+          </a:xfrm>
+          <a:prstGeom prst="rect">
+            <a:avLst/>
+          </a:prstGeom>
+          <a:solidFill>
+            <a:schemeClr val="tx1"/>
+          </a:solidFill>
+          <a:ln>
+            <a:noFill/>
+          </a:ln>
+        </p:spPr>
+        <p:style>
+          <a:lnRef idx="2">
+            <a:schemeClr val="dk1">
+              <a:shade val="50000"/>
+            </a:schemeClr>
+          </a:lnRef>
+          <a:fillRef idx="1">
+            <a:schemeClr val="dk1"/>
+          </a:fillRef>
+          <a:effectRef idx="0">
+            <a:schemeClr val="dk1"/>
+          </a:effectRef>
+          <a:fontRef idx="minor">
+            <a:schemeClr val="lt1"/>
+          </a:fontRef>
+        </p:style>
+        <p:txBody>
+          <a:bodyPr rtlCol="0" anchor="ctr"/>
+          <a:lstStyle/>
+          <a:p>
+            <a:pPr algn="ctr"/>
+            <a:endParaRPr lang="en-US"/>
+          </a:p>
+        </p:txBody>
+      </p:sp>
+      <p:sp>
+        <p:nvSpPr>
+          <p:cNvPr id="35" name="Rectangle 34"/>
+          <p:cNvSpPr/>
+          <p:nvPr/>
+        </p:nvSpPr>
+        <p:spPr>
+          <a:xfrm rot="5400000">
+            <a:off x="1060340" y="470079"/>
+            <a:ext cx="170755" cy="1946362"/>
+          </a:xfrm>
+          <a:prstGeom prst="rect">
+            <a:avLst/>
+          </a:prstGeom>
+          <a:solidFill>
+            <a:schemeClr val="tx1"/>
+          </a:solidFill>
+          <a:ln>
+            <a:noFill/>
+          </a:ln>
+        </p:spPr>
+        <p:style>
+          <a:lnRef idx="2">
+            <a:schemeClr val="dk1">
+              <a:shade val="50000"/>
+            </a:schemeClr>
+          </a:lnRef>
+          <a:fillRef idx="1">
+            <a:schemeClr val="dk1"/>
+          </a:fillRef>
+          <a:effectRef idx="0">
+            <a:schemeClr val="dk1"/>
+          </a:effectRef>
+          <a:fontRef idx="minor">
+            <a:schemeClr val="lt1"/>
+          </a:fontRef>
+        </p:style>
+        <p:txBody>
+          <a:bodyPr rtlCol="0" anchor="ctr"/>
+          <a:lstStyle/>
+          <a:p>
+            <a:pPr algn="ctr"/>
+            <a:endParaRPr lang="en-US"/>
+          </a:p>
+        </p:txBody>
+      </p:sp>
+      <p:sp>
+        <p:nvSpPr>
+          <p:cNvPr id="36" name="Rectangle 35"/>
+          <p:cNvSpPr/>
+          <p:nvPr/>
+        </p:nvSpPr>
+        <p:spPr>
+          <a:xfrm rot="5400000">
+            <a:off x="2359492" y="-1806508"/>
+            <a:ext cx="163494" cy="4537402"/>
+          </a:xfrm>
+          <a:prstGeom prst="rect">
+            <a:avLst/>
+          </a:prstGeom>
+          <a:solidFill>
+            <a:schemeClr val="tx1"/>
+          </a:solidFill>
+          <a:ln>
+            <a:noFill/>
+          </a:ln>
+        </p:spPr>
+        <p:style>
+          <a:lnRef idx="2">
+            <a:schemeClr val="dk1">
+              <a:shade val="50000"/>
+            </a:schemeClr>
+          </a:lnRef>
+          <a:fillRef idx="1">
+            <a:schemeClr val="dk1"/>
+          </a:fillRef>
+          <a:effectRef idx="0">
+            <a:schemeClr val="dk1"/>
+          </a:effectRef>
+          <a:fontRef idx="minor">
+            <a:schemeClr val="lt1"/>
+          </a:fontRef>
+        </p:style>
+        <p:txBody>
+          <a:bodyPr rtlCol="0" anchor="ctr"/>
+          <a:lstStyle/>
+          <a:p>
+            <a:pPr algn="ctr"/>
+            <a:endParaRPr lang="en-US"/>
+          </a:p>
+        </p:txBody>
+      </p:sp>
+      <p:sp>
+        <p:nvSpPr>
+          <p:cNvPr id="37" name="Rectangle 36"/>
+          <p:cNvSpPr/>
+          <p:nvPr/>
+        </p:nvSpPr>
+        <p:spPr>
+          <a:xfrm rot="5400000">
+            <a:off x="3906768" y="725466"/>
+            <a:ext cx="170754" cy="1435590"/>
+          </a:xfrm>
+          <a:prstGeom prst="rect">
+            <a:avLst/>
+          </a:prstGeom>
+          <a:solidFill>
+            <a:schemeClr val="tx1"/>
+          </a:solidFill>
+          <a:ln>
+            <a:noFill/>
+          </a:ln>
+        </p:spPr>
+        <p:style>
+          <a:lnRef idx="2">
+            <a:schemeClr val="dk1">
+              <a:shade val="50000"/>
+            </a:schemeClr>
+          </a:lnRef>
+          <a:fillRef idx="1">
+            <a:schemeClr val="dk1"/>
+          </a:fillRef>
+          <a:effectRef idx="0">
+            <a:schemeClr val="dk1"/>
+          </a:effectRef>
+          <a:fontRef idx="minor">
+            <a:schemeClr val="lt1"/>
+          </a:fontRef>
+        </p:style>
+        <p:txBody>
+          <a:bodyPr rtlCol="0" anchor="ctr"/>
+          <a:lstStyle/>
+          <a:p>
+            <a:pPr algn="ctr"/>
+            <a:endParaRPr lang="en-US"/>
+          </a:p>
+        </p:txBody>
+      </p:sp>
+      <p:sp>
+        <p:nvSpPr>
+          <p:cNvPr id="39" name="Rectangle 38"/>
+          <p:cNvSpPr/>
+          <p:nvPr/>
+        </p:nvSpPr>
+        <p:spPr>
+          <a:xfrm>
+            <a:off x="2121627" y="1705507"/>
+            <a:ext cx="173599" cy="1598733"/>
+          </a:xfrm>
+          <a:prstGeom prst="rect">
+            <a:avLst/>
+          </a:prstGeom>
+          <a:solidFill>
+            <a:srgbClr val="FFFF66"/>
+          </a:solidFill>
+          <a:ln>
+            <a:noFill/>
+          </a:ln>
+        </p:spPr>
+        <p:style>
+          <a:lnRef idx="2">
+            <a:schemeClr val="dk1">
+              <a:shade val="50000"/>
+            </a:schemeClr>
+          </a:lnRef>
+          <a:fillRef idx="1">
+            <a:schemeClr val="dk1"/>
+          </a:fillRef>
+          <a:effectRef idx="0">
+            <a:schemeClr val="dk1"/>
+          </a:effectRef>
+          <a:fontRef idx="minor">
+            <a:schemeClr val="lt1"/>
+          </a:fontRef>
+        </p:style>
+        <p:txBody>
+          <a:bodyPr rtlCol="0" anchor="ctr"/>
+          <a:lstStyle/>
+          <a:p>
+            <a:pPr algn="ctr"/>
+            <a:endParaRPr lang="en-US"/>
+          </a:p>
+        </p:txBody>
+      </p:sp>
+      <p:sp>
+        <p:nvSpPr>
+          <p:cNvPr id="40" name="Rectangle 39"/>
+          <p:cNvSpPr/>
+          <p:nvPr/>
+        </p:nvSpPr>
+        <p:spPr>
+          <a:xfrm rot="5400000">
+            <a:off x="968258" y="564890"/>
+            <a:ext cx="170757" cy="1756742"/>
+          </a:xfrm>
+          <a:prstGeom prst="rect">
+            <a:avLst/>
+          </a:prstGeom>
+          <a:solidFill>
+            <a:srgbClr val="66FF66"/>
+          </a:solidFill>
+          <a:ln>
+            <a:noFill/>
+          </a:ln>
+        </p:spPr>
+        <p:style>
+          <a:lnRef idx="2">
+            <a:schemeClr val="dk1">
+              <a:shade val="50000"/>
+            </a:schemeClr>
+          </a:lnRef>
+          <a:fillRef idx="1">
+            <a:schemeClr val="dk1"/>
+          </a:fillRef>
+          <a:effectRef idx="0">
+            <a:schemeClr val="dk1"/>
+          </a:effectRef>
+          <a:fontRef idx="minor">
+            <a:schemeClr val="lt1"/>
+          </a:fontRef>
+        </p:style>
+        <p:txBody>
+          <a:bodyPr rtlCol="0" anchor="ctr"/>
+          <a:lstStyle/>
+          <a:p>
+            <a:pPr algn="ctr"/>
+            <a:endParaRPr lang="en-US"/>
+          </a:p>
+        </p:txBody>
+      </p:sp>
+      <p:sp>
+        <p:nvSpPr>
+          <p:cNvPr id="41" name="Rectangle 40"/>
+          <p:cNvSpPr/>
+          <p:nvPr/>
+        </p:nvSpPr>
+        <p:spPr>
+          <a:xfrm rot="5400000">
+            <a:off x="969679" y="-418386"/>
+            <a:ext cx="170758" cy="1753900"/>
+          </a:xfrm>
+          <a:prstGeom prst="rect">
+            <a:avLst/>
+          </a:prstGeom>
+          <a:solidFill>
+            <a:srgbClr val="FF6666"/>
+          </a:solidFill>
+          <a:ln>
+            <a:noFill/>
+          </a:ln>
+        </p:spPr>
+        <p:style>
+          <a:lnRef idx="2">
+            <a:schemeClr val="dk1">
+              <a:shade val="50000"/>
+            </a:schemeClr>
+          </a:lnRef>
+          <a:fillRef idx="1">
+            <a:schemeClr val="dk1"/>
+          </a:fillRef>
+          <a:effectRef idx="0">
+            <a:schemeClr val="dk1"/>
+          </a:effectRef>
+          <a:fontRef idx="minor">
+            <a:schemeClr val="lt1"/>
+          </a:fontRef>
+        </p:style>
+        <p:txBody>
+          <a:bodyPr rtlCol="0" anchor="ctr"/>
+          <a:lstStyle/>
+          <a:p>
+            <a:pPr algn="ctr"/>
+            <a:endParaRPr lang="en-US"/>
+          </a:p>
+        </p:txBody>
+      </p:sp>
+      <p:sp>
+        <p:nvSpPr>
+          <p:cNvPr id="42" name="TextBox 41"/>
+          <p:cNvSpPr txBox="1"/>
+          <p:nvPr/>
+        </p:nvSpPr>
+        <p:spPr>
+          <a:xfrm>
+            <a:off x="1038291" y="2783780"/>
+            <a:ext cx="1107996" cy="369332"/>
+          </a:xfrm>
+          <a:prstGeom prst="rect">
+            <a:avLst/>
+          </a:prstGeom>
+          <a:noFill/>
+        </p:spPr>
+        <p:txBody>
+          <a:bodyPr wrap="none" rtlCol="0">
+            <a:spAutoFit/>
+          </a:bodyPr>
+          <a:lstStyle/>
+          <a:p>
+            <a:r>
+              <a:rPr lang="en-US" b="1" dirty="0" smtClean="0">
+                <a:latin typeface="Helvetica"/>
+                <a:cs typeface="Helvetica"/>
+              </a:rPr>
+              <a:t>start left</a:t>
+            </a:r>
+            <a:endParaRPr lang="en-US" b="1" dirty="0">
+              <a:latin typeface="Helvetica"/>
+              <a:cs typeface="Helvetica"/>
+            </a:endParaRPr>
+          </a:p>
+        </p:txBody>
+      </p:sp>
+      <p:sp>
+        <p:nvSpPr>
+          <p:cNvPr id="43" name="TextBox 42"/>
+          <p:cNvSpPr txBox="1"/>
+          <p:nvPr/>
+        </p:nvSpPr>
+        <p:spPr>
+          <a:xfrm>
+            <a:off x="295092" y="1528639"/>
+            <a:ext cx="1082348" cy="369332"/>
+          </a:xfrm>
+          <a:prstGeom prst="rect">
+            <a:avLst/>
+          </a:prstGeom>
+          <a:noFill/>
+        </p:spPr>
+        <p:txBody>
+          <a:bodyPr wrap="none" rtlCol="0">
+            <a:spAutoFit/>
+          </a:bodyPr>
+          <a:lstStyle/>
+          <a:p>
+            <a:r>
+              <a:rPr lang="en-US" b="1" dirty="0" smtClean="0">
+                <a:latin typeface="Helvetica"/>
+                <a:cs typeface="Helvetica"/>
+              </a:rPr>
+              <a:t>next left</a:t>
+            </a:r>
+            <a:endParaRPr lang="en-US" b="1" dirty="0">
+              <a:latin typeface="Helvetica"/>
+              <a:cs typeface="Helvetica"/>
+            </a:endParaRPr>
+          </a:p>
+        </p:txBody>
+      </p:sp>
+      <p:sp>
+        <p:nvSpPr>
+          <p:cNvPr id="44" name="TextBox 43"/>
+          <p:cNvSpPr txBox="1"/>
+          <p:nvPr/>
+        </p:nvSpPr>
+        <p:spPr>
+          <a:xfrm>
+            <a:off x="295092" y="11114"/>
+            <a:ext cx="1249060" cy="369332"/>
+          </a:xfrm>
+          <a:prstGeom prst="rect">
+            <a:avLst/>
+          </a:prstGeom>
+          <a:noFill/>
+        </p:spPr>
+        <p:txBody>
+          <a:bodyPr wrap="none" rtlCol="0">
+            <a:spAutoFit/>
+          </a:bodyPr>
+          <a:lstStyle/>
+          <a:p>
+            <a:r>
+              <a:rPr lang="en-US" b="1" dirty="0" smtClean="0">
+                <a:latin typeface="Helvetica"/>
+                <a:cs typeface="Helvetica"/>
+              </a:rPr>
+              <a:t>next right</a:t>
+            </a:r>
+            <a:endParaRPr lang="en-US" b="1" dirty="0">
+              <a:latin typeface="Helvetica"/>
+              <a:cs typeface="Helvetica"/>
+            </a:endParaRPr>
+          </a:p>
+        </p:txBody>
+      </p:sp>
+      <p:sp>
+        <p:nvSpPr>
+          <p:cNvPr id="45" name="Rectangle 44"/>
+          <p:cNvSpPr/>
+          <p:nvPr/>
+        </p:nvSpPr>
+        <p:spPr>
+          <a:xfrm>
+            <a:off x="178109" y="3530615"/>
+            <a:ext cx="4531830" cy="3293127"/>
+          </a:xfrm>
+          <a:prstGeom prst="rect">
+            <a:avLst/>
+          </a:prstGeom>
+          <a:solidFill>
+            <a:schemeClr val="bg1">
+              <a:lumMod val="65000"/>
+            </a:schemeClr>
+          </a:solidFill>
+          <a:ln>
+            <a:solidFill>
+              <a:schemeClr val="bg1">
+                <a:lumMod val="65000"/>
+              </a:schemeClr>
+            </a:solidFill>
+          </a:ln>
+        </p:spPr>
+        <p:style>
+          <a:lnRef idx="2">
+            <a:schemeClr val="dk1">
+              <a:shade val="50000"/>
+            </a:schemeClr>
+          </a:lnRef>
+          <a:fillRef idx="1">
+            <a:schemeClr val="dk1"/>
+          </a:fillRef>
+          <a:effectRef idx="0">
+            <a:schemeClr val="dk1"/>
+          </a:effectRef>
+          <a:fontRef idx="minor">
+            <a:schemeClr val="lt1"/>
+          </a:fontRef>
+        </p:style>
+        <p:txBody>
+          <a:bodyPr rtlCol="0" anchor="ctr"/>
+          <a:lstStyle/>
+          <a:p>
+            <a:pPr algn="ctr"/>
+            <a:endParaRPr lang="en-US" dirty="0"/>
+          </a:p>
+        </p:txBody>
+      </p:sp>
+      <p:sp>
+        <p:nvSpPr>
+          <p:cNvPr id="46" name="Rectangle 45"/>
+          <p:cNvSpPr/>
+          <p:nvPr/>
+        </p:nvSpPr>
+        <p:spPr>
+          <a:xfrm>
+            <a:off x="2295226" y="4063440"/>
+            <a:ext cx="813940" cy="2760302"/>
+          </a:xfrm>
+          <a:prstGeom prst="rect">
+            <a:avLst/>
+          </a:prstGeom>
+          <a:solidFill>
+            <a:schemeClr val="bg1"/>
+          </a:solidFill>
+          <a:ln>
+            <a:noFill/>
+          </a:ln>
+        </p:spPr>
+        <p:style>
+          <a:lnRef idx="2">
+            <a:schemeClr val="dk1">
+              <a:shade val="50000"/>
+            </a:schemeClr>
+          </a:lnRef>
+          <a:fillRef idx="1">
+            <a:schemeClr val="dk1"/>
+          </a:fillRef>
+          <a:effectRef idx="0">
+            <a:schemeClr val="dk1"/>
+          </a:effectRef>
+          <a:fontRef idx="minor">
+            <a:schemeClr val="lt1"/>
+          </a:fontRef>
+        </p:style>
+        <p:txBody>
+          <a:bodyPr rtlCol="0" anchor="ctr"/>
+          <a:lstStyle/>
+          <a:p>
+            <a:pPr algn="ctr"/>
+            <a:endParaRPr lang="en-US"/>
+          </a:p>
+        </p:txBody>
+      </p:sp>
+      <p:sp>
+        <p:nvSpPr>
+          <p:cNvPr id="47" name="Rectangle 46"/>
+          <p:cNvSpPr/>
+          <p:nvPr/>
+        </p:nvSpPr>
+        <p:spPr>
+          <a:xfrm rot="16200000">
+            <a:off x="2037054" y="2204495"/>
+            <a:ext cx="813940" cy="4531830"/>
+          </a:xfrm>
+          <a:prstGeom prst="rect">
+            <a:avLst/>
+          </a:prstGeom>
+          <a:solidFill>
+            <a:schemeClr val="bg1"/>
+          </a:solidFill>
+          <a:ln>
+            <a:noFill/>
+          </a:ln>
+        </p:spPr>
+        <p:style>
+          <a:lnRef idx="2">
+            <a:schemeClr val="dk1">
+              <a:shade val="50000"/>
+            </a:schemeClr>
+          </a:lnRef>
+          <a:fillRef idx="1">
+            <a:schemeClr val="dk1"/>
+          </a:fillRef>
+          <a:effectRef idx="0">
+            <a:schemeClr val="dk1"/>
+          </a:effectRef>
+          <a:fontRef idx="minor">
+            <a:schemeClr val="lt1"/>
+          </a:fontRef>
+        </p:style>
+        <p:txBody>
+          <a:bodyPr rtlCol="0" anchor="ctr"/>
+          <a:lstStyle/>
+          <a:p>
+            <a:pPr algn="ctr"/>
+            <a:endParaRPr lang="en-US"/>
+          </a:p>
+        </p:txBody>
+      </p:sp>
+      <p:pic>
+        <p:nvPicPr>
+          <p:cNvPr id="48" name="Picture 47" descr="pawn_white.png"/>
+          <p:cNvPicPr>
+            <a:picLocks noChangeAspect="1"/>
+          </p:cNvPicPr>
+          <p:nvPr/>
+        </p:nvPicPr>
+        <p:blipFill>
+          <a:blip r:embed="rId2">
+            <a:extLst>
+              <a:ext uri="{28A0092B-C50C-407E-A947-70E740481C1C}">
+                <a14:useLocalDpi xmlns:a14="http://schemas.microsoft.com/office/drawing/2010/main" val="0"/>
+              </a:ext>
+            </a:extLst>
+          </a:blip>
+          <a:stretch>
+            <a:fillRect/>
+          </a:stretch>
+        </p:blipFill>
+        <p:spPr>
+          <a:xfrm>
+            <a:off x="3504877" y="5851381"/>
+            <a:ext cx="646189" cy="833561"/>
+          </a:xfrm>
+          <a:prstGeom prst="rect">
+            <a:avLst/>
+          </a:prstGeom>
+          <a:ln>
+            <a:noFill/>
+          </a:ln>
+        </p:spPr>
+      </p:pic>
+      <p:sp>
+        <p:nvSpPr>
+          <p:cNvPr id="49" name="Rectangle 48"/>
+          <p:cNvSpPr/>
+          <p:nvPr/>
+        </p:nvSpPr>
+        <p:spPr>
+          <a:xfrm>
+            <a:off x="2618381" y="4499157"/>
+            <a:ext cx="170755" cy="2324585"/>
+          </a:xfrm>
+          <a:prstGeom prst="rect">
+            <a:avLst/>
+          </a:prstGeom>
+          <a:solidFill>
+            <a:srgbClr val="0000FF"/>
+          </a:solidFill>
+          <a:ln>
+            <a:noFill/>
+          </a:ln>
+        </p:spPr>
+        <p:style>
+          <a:lnRef idx="2">
+            <a:schemeClr val="dk1">
+              <a:shade val="50000"/>
+            </a:schemeClr>
+          </a:lnRef>
+          <a:fillRef idx="1">
+            <a:schemeClr val="dk1"/>
+          </a:fillRef>
+          <a:effectRef idx="0">
+            <a:schemeClr val="dk1"/>
+          </a:effectRef>
+          <a:fontRef idx="minor">
+            <a:schemeClr val="lt1"/>
+          </a:fontRef>
+        </p:style>
+        <p:txBody>
+          <a:bodyPr rtlCol="0" anchor="ctr"/>
+          <a:lstStyle/>
+          <a:p>
+            <a:pPr algn="ctr"/>
+            <a:endParaRPr lang="en-US"/>
+          </a:p>
+        </p:txBody>
+      </p:sp>
+      <p:sp>
+        <p:nvSpPr>
+          <p:cNvPr id="50" name="Rectangle 49"/>
+          <p:cNvSpPr/>
+          <p:nvPr/>
+        </p:nvSpPr>
+        <p:spPr>
+          <a:xfrm rot="16200000">
+            <a:off x="1398247" y="3141400"/>
+            <a:ext cx="170756" cy="2611027"/>
+          </a:xfrm>
+          <a:prstGeom prst="rect">
+            <a:avLst/>
+          </a:prstGeom>
+          <a:solidFill>
+            <a:srgbClr val="0000FF"/>
+          </a:solidFill>
+          <a:ln>
+            <a:noFill/>
+          </a:ln>
+        </p:spPr>
+        <p:style>
+          <a:lnRef idx="2">
+            <a:schemeClr val="dk1">
+              <a:shade val="50000"/>
+            </a:schemeClr>
+          </a:lnRef>
+          <a:fillRef idx="1">
+            <a:schemeClr val="dk1"/>
+          </a:fillRef>
+          <a:effectRef idx="0">
+            <a:schemeClr val="dk1"/>
+          </a:effectRef>
+          <a:fontRef idx="minor">
+            <a:schemeClr val="lt1"/>
+          </a:fontRef>
+        </p:style>
+        <p:txBody>
+          <a:bodyPr rtlCol="0" anchor="ctr"/>
+          <a:lstStyle/>
+          <a:p>
+            <a:pPr algn="ctr"/>
+            <a:endParaRPr lang="en-US"/>
+          </a:p>
+        </p:txBody>
+      </p:sp>
+      <p:sp>
+        <p:nvSpPr>
+          <p:cNvPr id="51" name="Isosceles Triangle 50"/>
+          <p:cNvSpPr/>
+          <p:nvPr/>
+        </p:nvSpPr>
+        <p:spPr>
+          <a:xfrm rot="16200000">
+            <a:off x="914895" y="4271644"/>
+            <a:ext cx="414516" cy="338476"/>
+          </a:xfrm>
+          <a:prstGeom prst="triangle">
+            <a:avLst/>
+          </a:prstGeom>
+          <a:solidFill>
+            <a:srgbClr val="0000FF"/>
+          </a:solidFill>
+          <a:ln>
+            <a:noFill/>
+          </a:ln>
+        </p:spPr>
+        <p:style>
+          <a:lnRef idx="2">
+            <a:schemeClr val="accent1"/>
+          </a:lnRef>
+          <a:fillRef idx="1">
+            <a:schemeClr val="lt1"/>
+          </a:fillRef>
+          <a:effectRef idx="0">
+            <a:schemeClr val="accent1"/>
+          </a:effectRef>
+          <a:fontRef idx="minor">
+            <a:schemeClr val="dk1"/>
+          </a:fontRef>
+        </p:style>
+        <p:txBody>
+          <a:bodyPr rtlCol="0" anchor="ctr"/>
+          <a:lstStyle/>
+          <a:p>
+            <a:pPr algn="ctr"/>
+            <a:endParaRPr lang="en-US"/>
+          </a:p>
+        </p:txBody>
+      </p:sp>
+      <p:sp>
+        <p:nvSpPr>
+          <p:cNvPr id="52" name="Isosceles Triangle 51"/>
+          <p:cNvSpPr/>
+          <p:nvPr/>
+        </p:nvSpPr>
+        <p:spPr>
+          <a:xfrm>
+            <a:off x="2492194" y="5225009"/>
+            <a:ext cx="414516" cy="338476"/>
+          </a:xfrm>
+          <a:prstGeom prst="triangle">
+            <a:avLst/>
+          </a:prstGeom>
+          <a:solidFill>
+            <a:srgbClr val="0000FF"/>
+          </a:solidFill>
+          <a:ln>
+            <a:noFill/>
+          </a:ln>
+        </p:spPr>
+        <p:style>
+          <a:lnRef idx="2">
+            <a:schemeClr val="accent1"/>
+          </a:lnRef>
+          <a:fillRef idx="1">
+            <a:schemeClr val="lt1"/>
+          </a:fillRef>
+          <a:effectRef idx="0">
+            <a:schemeClr val="accent1"/>
+          </a:effectRef>
+          <a:fontRef idx="minor">
+            <a:schemeClr val="dk1"/>
+          </a:fontRef>
+        </p:style>
+        <p:txBody>
+          <a:bodyPr rtlCol="0" anchor="ctr"/>
+          <a:lstStyle/>
+          <a:p>
+            <a:pPr algn="ctr"/>
+            <a:endParaRPr lang="en-US"/>
+          </a:p>
+        </p:txBody>
+      </p:sp>
+      <p:sp>
+        <p:nvSpPr>
+          <p:cNvPr id="53" name="Rectangle 52"/>
+          <p:cNvSpPr/>
+          <p:nvPr/>
+        </p:nvSpPr>
+        <p:spPr>
+          <a:xfrm>
+            <a:off x="3109166" y="4877381"/>
+            <a:ext cx="170755" cy="1946362"/>
+          </a:xfrm>
+          <a:prstGeom prst="rect">
+            <a:avLst/>
+          </a:prstGeom>
+          <a:solidFill>
+            <a:schemeClr val="tx1"/>
+          </a:solidFill>
+          <a:ln>
+            <a:noFill/>
+          </a:ln>
+        </p:spPr>
+        <p:style>
+          <a:lnRef idx="2">
+            <a:schemeClr val="dk1">
+              <a:shade val="50000"/>
+            </a:schemeClr>
+          </a:lnRef>
+          <a:fillRef idx="1">
+            <a:schemeClr val="dk1"/>
+          </a:fillRef>
+          <a:effectRef idx="0">
+            <a:schemeClr val="dk1"/>
+          </a:effectRef>
+          <a:fontRef idx="minor">
+            <a:schemeClr val="lt1"/>
+          </a:fontRef>
+        </p:style>
+        <p:txBody>
+          <a:bodyPr rtlCol="0" anchor="ctr"/>
+          <a:lstStyle/>
+          <a:p>
+            <a:pPr algn="ctr"/>
+            <a:endParaRPr lang="en-US"/>
+          </a:p>
+        </p:txBody>
+      </p:sp>
+      <p:sp>
+        <p:nvSpPr>
+          <p:cNvPr id="54" name="Rectangle 53"/>
+          <p:cNvSpPr/>
+          <p:nvPr/>
+        </p:nvSpPr>
+        <p:spPr>
+          <a:xfrm>
+            <a:off x="2124471" y="4877381"/>
+            <a:ext cx="170755" cy="1946362"/>
+          </a:xfrm>
+          <a:prstGeom prst="rect">
+            <a:avLst/>
+          </a:prstGeom>
+          <a:solidFill>
+            <a:schemeClr val="tx1"/>
+          </a:solidFill>
+          <a:ln>
+            <a:noFill/>
+          </a:ln>
+        </p:spPr>
+        <p:style>
+          <a:lnRef idx="2">
+            <a:schemeClr val="dk1">
+              <a:shade val="50000"/>
+            </a:schemeClr>
+          </a:lnRef>
+          <a:fillRef idx="1">
+            <a:schemeClr val="dk1"/>
+          </a:fillRef>
+          <a:effectRef idx="0">
+            <a:schemeClr val="dk1"/>
+          </a:effectRef>
+          <a:fontRef idx="minor">
+            <a:schemeClr val="lt1"/>
+          </a:fontRef>
+        </p:style>
+        <p:txBody>
+          <a:bodyPr rtlCol="0" anchor="ctr"/>
+          <a:lstStyle/>
+          <a:p>
+            <a:pPr algn="ctr"/>
+            <a:endParaRPr lang="en-US"/>
+          </a:p>
+        </p:txBody>
+      </p:sp>
+      <p:sp>
+        <p:nvSpPr>
+          <p:cNvPr id="55" name="Rectangle 54"/>
+          <p:cNvSpPr/>
+          <p:nvPr/>
+        </p:nvSpPr>
+        <p:spPr>
+          <a:xfrm rot="5400000">
+            <a:off x="1065912" y="3989580"/>
+            <a:ext cx="170755" cy="1946362"/>
+          </a:xfrm>
+          <a:prstGeom prst="rect">
+            <a:avLst/>
+          </a:prstGeom>
+          <a:solidFill>
+            <a:schemeClr val="tx1"/>
+          </a:solidFill>
+          <a:ln>
+            <a:noFill/>
+          </a:ln>
+        </p:spPr>
+        <p:style>
+          <a:lnRef idx="2">
+            <a:schemeClr val="dk1">
+              <a:shade val="50000"/>
+            </a:schemeClr>
+          </a:lnRef>
+          <a:fillRef idx="1">
+            <a:schemeClr val="dk1"/>
+          </a:fillRef>
+          <a:effectRef idx="0">
+            <a:schemeClr val="dk1"/>
+          </a:effectRef>
+          <a:fontRef idx="minor">
+            <a:schemeClr val="lt1"/>
+          </a:fontRef>
+        </p:style>
+        <p:txBody>
+          <a:bodyPr rtlCol="0" anchor="ctr"/>
+          <a:lstStyle/>
+          <a:p>
+            <a:pPr algn="ctr"/>
+            <a:endParaRPr lang="en-US"/>
+          </a:p>
+        </p:txBody>
+      </p:sp>
+      <p:sp>
+        <p:nvSpPr>
+          <p:cNvPr id="56" name="Rectangle 55"/>
+          <p:cNvSpPr/>
+          <p:nvPr/>
+        </p:nvSpPr>
+        <p:spPr>
+          <a:xfrm rot="5400000">
+            <a:off x="2358647" y="1712148"/>
+            <a:ext cx="170756" cy="4531830"/>
+          </a:xfrm>
+          <a:prstGeom prst="rect">
+            <a:avLst/>
+          </a:prstGeom>
+          <a:solidFill>
+            <a:schemeClr val="tx1"/>
+          </a:solidFill>
+          <a:ln>
+            <a:noFill/>
+          </a:ln>
+        </p:spPr>
+        <p:style>
+          <a:lnRef idx="2">
+            <a:schemeClr val="dk1">
+              <a:shade val="50000"/>
+            </a:schemeClr>
+          </a:lnRef>
+          <a:fillRef idx="1">
+            <a:schemeClr val="dk1"/>
+          </a:fillRef>
+          <a:effectRef idx="0">
+            <a:schemeClr val="dk1"/>
+          </a:effectRef>
+          <a:fontRef idx="minor">
+            <a:schemeClr val="lt1"/>
+          </a:fontRef>
+        </p:style>
+        <p:txBody>
+          <a:bodyPr rtlCol="0" anchor="ctr"/>
+          <a:lstStyle/>
+          <a:p>
+            <a:pPr algn="ctr"/>
+            <a:endParaRPr lang="en-US"/>
+          </a:p>
+        </p:txBody>
+      </p:sp>
+      <p:sp>
+        <p:nvSpPr>
+          <p:cNvPr id="57" name="Rectangle 56"/>
+          <p:cNvSpPr/>
+          <p:nvPr/>
+        </p:nvSpPr>
+        <p:spPr>
+          <a:xfrm rot="5400000">
+            <a:off x="3909554" y="4247753"/>
+            <a:ext cx="170754" cy="1430017"/>
+          </a:xfrm>
+          <a:prstGeom prst="rect">
+            <a:avLst/>
+          </a:prstGeom>
+          <a:solidFill>
+            <a:schemeClr val="tx1"/>
+          </a:solidFill>
+          <a:ln>
+            <a:noFill/>
+          </a:ln>
+        </p:spPr>
+        <p:style>
+          <a:lnRef idx="2">
+            <a:schemeClr val="dk1">
+              <a:shade val="50000"/>
+            </a:schemeClr>
+          </a:lnRef>
+          <a:fillRef idx="1">
+            <a:schemeClr val="dk1"/>
+          </a:fillRef>
+          <a:effectRef idx="0">
+            <a:schemeClr val="dk1"/>
+          </a:effectRef>
+          <a:fontRef idx="minor">
+            <a:schemeClr val="lt1"/>
+          </a:fontRef>
+        </p:style>
+        <p:txBody>
+          <a:bodyPr rtlCol="0" anchor="ctr"/>
+          <a:lstStyle/>
+          <a:p>
+            <a:pPr algn="ctr"/>
+            <a:endParaRPr lang="en-US"/>
+          </a:p>
+        </p:txBody>
+      </p:sp>
+      <p:sp>
+        <p:nvSpPr>
+          <p:cNvPr id="58" name="Rectangle 57"/>
+          <p:cNvSpPr/>
+          <p:nvPr/>
+        </p:nvSpPr>
+        <p:spPr>
+          <a:xfrm>
+            <a:off x="3111893" y="5225009"/>
+            <a:ext cx="168028" cy="1598734"/>
+          </a:xfrm>
+          <a:prstGeom prst="rect">
+            <a:avLst/>
+          </a:prstGeom>
+          <a:solidFill>
+            <a:srgbClr val="FFFF66"/>
+          </a:solidFill>
+          <a:ln>
+            <a:noFill/>
+          </a:ln>
+        </p:spPr>
+        <p:style>
+          <a:lnRef idx="2">
+            <a:schemeClr val="dk1">
+              <a:shade val="50000"/>
+            </a:schemeClr>
+          </a:lnRef>
+          <a:fillRef idx="1">
+            <a:schemeClr val="dk1"/>
+          </a:fillRef>
+          <a:effectRef idx="0">
+            <a:schemeClr val="dk1"/>
+          </a:effectRef>
+          <a:fontRef idx="minor">
+            <a:schemeClr val="lt1"/>
+          </a:fontRef>
+        </p:style>
+        <p:txBody>
+          <a:bodyPr rtlCol="0" anchor="ctr"/>
+          <a:lstStyle/>
+          <a:p>
+            <a:pPr algn="ctr"/>
+            <a:endParaRPr lang="en-US"/>
+          </a:p>
+        </p:txBody>
+      </p:sp>
+      <p:sp>
+        <p:nvSpPr>
+          <p:cNvPr id="59" name="Rectangle 58"/>
+          <p:cNvSpPr/>
+          <p:nvPr/>
+        </p:nvSpPr>
+        <p:spPr>
+          <a:xfrm rot="5400000">
+            <a:off x="971042" y="4087174"/>
+            <a:ext cx="170759" cy="1751172"/>
+          </a:xfrm>
+          <a:prstGeom prst="rect">
+            <a:avLst/>
+          </a:prstGeom>
+          <a:solidFill>
+            <a:srgbClr val="66FF66"/>
+          </a:solidFill>
+          <a:ln>
+            <a:noFill/>
+          </a:ln>
+        </p:spPr>
+        <p:style>
+          <a:lnRef idx="2">
+            <a:schemeClr val="dk1">
+              <a:shade val="50000"/>
+            </a:schemeClr>
+          </a:lnRef>
+          <a:fillRef idx="1">
+            <a:schemeClr val="dk1"/>
+          </a:fillRef>
+          <a:effectRef idx="0">
+            <a:schemeClr val="dk1"/>
+          </a:effectRef>
+          <a:fontRef idx="minor">
+            <a:schemeClr val="lt1"/>
+          </a:fontRef>
+        </p:style>
+        <p:txBody>
+          <a:bodyPr rtlCol="0" anchor="ctr"/>
+          <a:lstStyle/>
+          <a:p>
+            <a:pPr algn="ctr"/>
+            <a:endParaRPr lang="en-US"/>
+          </a:p>
+        </p:txBody>
+      </p:sp>
+      <p:sp>
+        <p:nvSpPr>
+          <p:cNvPr id="60" name="Rectangle 59"/>
+          <p:cNvSpPr/>
+          <p:nvPr/>
+        </p:nvSpPr>
+        <p:spPr>
+          <a:xfrm rot="5400000">
+            <a:off x="972463" y="3103900"/>
+            <a:ext cx="170759" cy="1748329"/>
+          </a:xfrm>
+          <a:prstGeom prst="rect">
+            <a:avLst/>
+          </a:prstGeom>
+          <a:solidFill>
+            <a:srgbClr val="FF6666"/>
+          </a:solidFill>
+          <a:ln>
+            <a:noFill/>
+          </a:ln>
+        </p:spPr>
+        <p:style>
+          <a:lnRef idx="2">
+            <a:schemeClr val="dk1">
+              <a:shade val="50000"/>
+            </a:schemeClr>
+          </a:lnRef>
+          <a:fillRef idx="1">
+            <a:schemeClr val="dk1"/>
+          </a:fillRef>
+          <a:effectRef idx="0">
+            <a:schemeClr val="dk1"/>
+          </a:effectRef>
+          <a:fontRef idx="minor">
+            <a:schemeClr val="lt1"/>
+          </a:fontRef>
+        </p:style>
+        <p:txBody>
+          <a:bodyPr rtlCol="0" anchor="ctr"/>
+          <a:lstStyle/>
+          <a:p>
+            <a:pPr algn="ctr"/>
+            <a:endParaRPr lang="en-US"/>
+          </a:p>
+        </p:txBody>
+      </p:sp>
+      <p:sp>
+        <p:nvSpPr>
+          <p:cNvPr id="61" name="TextBox 60"/>
+          <p:cNvSpPr txBox="1"/>
+          <p:nvPr/>
+        </p:nvSpPr>
+        <p:spPr>
+          <a:xfrm>
+            <a:off x="3257349" y="6303281"/>
+            <a:ext cx="1274708" cy="369332"/>
+          </a:xfrm>
+          <a:prstGeom prst="rect">
+            <a:avLst/>
+          </a:prstGeom>
+          <a:noFill/>
+        </p:spPr>
+        <p:txBody>
+          <a:bodyPr wrap="none" rtlCol="0">
+            <a:spAutoFit/>
+          </a:bodyPr>
+          <a:lstStyle/>
+          <a:p>
+            <a:r>
+              <a:rPr lang="en-US" b="1" dirty="0" smtClean="0">
+                <a:latin typeface="Helvetica"/>
+                <a:cs typeface="Helvetica"/>
+              </a:rPr>
+              <a:t>start right</a:t>
+            </a:r>
+            <a:endParaRPr lang="en-US" b="1" dirty="0">
+              <a:latin typeface="Helvetica"/>
+              <a:cs typeface="Helvetica"/>
+            </a:endParaRPr>
+          </a:p>
+        </p:txBody>
+      </p:sp>
+      <p:sp>
+        <p:nvSpPr>
+          <p:cNvPr id="62" name="TextBox 61"/>
+          <p:cNvSpPr txBox="1"/>
+          <p:nvPr/>
+        </p:nvSpPr>
+        <p:spPr>
+          <a:xfrm>
+            <a:off x="300664" y="5048140"/>
+            <a:ext cx="1082348" cy="369332"/>
+          </a:xfrm>
+          <a:prstGeom prst="rect">
+            <a:avLst/>
+          </a:prstGeom>
+          <a:noFill/>
+        </p:spPr>
+        <p:txBody>
+          <a:bodyPr wrap="none" rtlCol="0">
+            <a:spAutoFit/>
+          </a:bodyPr>
+          <a:lstStyle/>
+          <a:p>
+            <a:r>
+              <a:rPr lang="en-US" b="1" dirty="0" smtClean="0">
+                <a:latin typeface="Helvetica"/>
+                <a:cs typeface="Helvetica"/>
+              </a:rPr>
+              <a:t>next left</a:t>
+            </a:r>
+            <a:endParaRPr lang="en-US" b="1" dirty="0">
+              <a:latin typeface="Helvetica"/>
+              <a:cs typeface="Helvetica"/>
+            </a:endParaRPr>
+          </a:p>
+        </p:txBody>
+      </p:sp>
+      <p:sp>
+        <p:nvSpPr>
+          <p:cNvPr id="63" name="TextBox 62"/>
+          <p:cNvSpPr txBox="1"/>
+          <p:nvPr/>
+        </p:nvSpPr>
+        <p:spPr>
+          <a:xfrm>
+            <a:off x="300664" y="3530615"/>
+            <a:ext cx="1249060" cy="369332"/>
+          </a:xfrm>
+          <a:prstGeom prst="rect">
+            <a:avLst/>
+          </a:prstGeom>
+          <a:noFill/>
+        </p:spPr>
+        <p:txBody>
+          <a:bodyPr wrap="none" rtlCol="0">
+            <a:spAutoFit/>
+          </a:bodyPr>
+          <a:lstStyle/>
+          <a:p>
+            <a:r>
+              <a:rPr lang="en-US" b="1" dirty="0" smtClean="0">
+                <a:latin typeface="Helvetica"/>
+                <a:cs typeface="Helvetica"/>
+              </a:rPr>
+              <a:t>next right</a:t>
+            </a:r>
+            <a:endParaRPr lang="en-US" b="1" dirty="0">
+              <a:latin typeface="Helvetica"/>
+              <a:cs typeface="Helvetica"/>
+            </a:endParaRPr>
+          </a:p>
+        </p:txBody>
+      </p:sp>
+    </p:spTree>
+    <p:extLst>
+      <p:ext uri="{BB962C8B-B14F-4D97-AF65-F5344CB8AC3E}">
+        <p14:creationId xmlns:p14="http://schemas.microsoft.com/office/powerpoint/2010/main" val="2981357710"/>
       </p:ext>
     </p:extLst>
   </p:cSld>

</xml_diff>